<commit_message>
using namespace and composer
</commit_message>
<xml_diff>
--- a/bai-giang.pptx
+++ b/bai-giang.pptx
@@ -1187,6 +1187,60 @@
   <inkml:trace contextRef="#ctx0" brushRef="#br0" timeOffset="1.83822E6">17830 776 11131,'22'-30'719,"5"-4"-719,0 11 90,31 0 0,-39 16-90,31 3-450,-29 4-179,-2 23-2340,-9 12 811,-3 14 1987,-34 7 0,0-6 0,2-22 0,-1-1 1</inkml:trace>
   <inkml:trace contextRef="#ctx0" brushRef="#br0" timeOffset="1.83888E6">12867 2054 10231,'10'-8'1439,"1"2"-989,0 0-90,-2 1 0,1-2-180,-4 2 449,2 0-449,-6 3-90,4 1 180,-3 1-90,1 17 0,1-13 0,0 34-90,2-17-1,1 23 1,-2-12 0,1 1 0,3 24-1331,-1 1 0,-1 3 1241,-3-21 0,0 1 0,2 15 0,0 1 0,-2-13 0,0-2-828,1 3 0,-1-1 828,0 0 0,0 2-45,3 17 0,1 1 0,-3-17 0,0 0-45,0 2 0,0 4 0,0-5-106,-1-7 1,0-1-75,2 22 0,0-1 1,1 2 134,-4-24 0,0-1-855,1 21 451,-2-17-901,-1 12 361,-1-30-2741,-1 2 3820,0-16 0,0-3 0,0-6 0</inkml:trace>
   <inkml:trace contextRef="#ctx0" brushRef="#br0" timeOffset="1.83937E6">12888 3305 12030,'0'-3'2429,"17"0"-2429,-13 20 180,24 11-180,-25 11 90,20 4-90,-7 15 0,5-9 45,-6-5 0,0 0-1012,3 11 1012,-6-20 0,0 0-45,4 12 90,-1-1-90,0-5 0,-1-4-260,0-5 260,-2-4 356,3-1-86,-3-12-180,0-1-90,-4-12 786,5-17-786,-3 11 0,5-37 0,0 19 0,3-25 0,3 4-360,-3 8 0,1-2-254,10-22-376,-2 7 1,1-1-1,-11 21 1,-1 1 989,12-22 0,0 1 0,3-7 0,-11 21 0,0 1 0</inkml:trace>
+</inkml:ink>
+</file>
+
+<file path=ppt/ink/ink13.xml><?xml version="1.0" encoding="utf-8"?>
+<inkml:ink xmlns:inkml="http://www.w3.org/2003/InkML">
+  <inkml:definitions>
+    <inkml:context xml:id="ctx0">
+      <inkml:inkSource xml:id="inkSrc0">
+        <inkml:traceFormat>
+          <inkml:channel name="X" type="integer" min="-2.14748E9" max="2.14748E9" units="cm"/>
+          <inkml:channel name="Y" type="integer" min="-2.14748E9" max="2.14748E9" units="cm"/>
+          <inkml:channel name="F" type="integer" max="32767" units="dev"/>
+        </inkml:traceFormat>
+        <inkml:channelProperties>
+          <inkml:channelProperty channel="X" name="resolution" value="1000" units="1/cm"/>
+          <inkml:channelProperty channel="Y" name="resolution" value="1000" units="1/cm"/>
+          <inkml:channelProperty channel="F" name="resolution" value="0" units="1/dev"/>
+        </inkml:channelProperties>
+      </inkml:inkSource>
+      <inkml:timestamp xml:id="ts0" timeString="2021-09-20T03:08:44.670"/>
+    </inkml:context>
+    <inkml:brush xml:id="br0">
+      <inkml:brushProperty name="width" value="0.12095" units="cm"/>
+      <inkml:brushProperty name="height" value="0.12095" units="cm"/>
+      <inkml:brushProperty name="color" value="#FF0000"/>
+    </inkml:brush>
+    <inkml:brush xml:id="br1">
+      <inkml:brushProperty name="width" value="0.09071" units="cm"/>
+      <inkml:brushProperty name="height" value="0.09071" units="cm"/>
+      <inkml:brushProperty name="color" value="#FF0000"/>
+    </inkml:brush>
+  </inkml:definitions>
+  <inkml:trace contextRef="#ctx0" brushRef="#br0">2713 1949 6225,'-13'-5'4501,"10"2"-885,-11-1-4042,14 1 4199,0-1-809,-9 3-4195,6 16 2745,-6 9 814,9 11 136,0 4-1086,0-2 1229,0 5-2607,0-8 0,0 1 0,0 20 1409,0-7 1,0 1-1175,0 9-235,0-11 0,0 0 0,0 4 0,0 7 0,0-26 0,0-7 0,0-6 0,0-7 0,0-34 0,0 0 0,7-16 0,3-4 0,7-14-19,-7 15 0,1-1-356,4 10 1,-2 0-938,-9-31 298,23 4-1171,-20 22 1,0 2-619,14-13 2642,-2-5 1,-6 29 0,2 5 0</inkml:trace>
+  <inkml:trace contextRef="#ctx0" brushRef="#br0" timeOffset="1500">3108 2345 5056,'26'0'360,"-4"0"-1,0 0-269,-1-12 1632,0 9-1632,4-9 657,-1 4-387,2 5-106,-1-11 708,-1 12-837,0-13 1050,-1 8-1596,-1-8 1298,-1 3-756,-2 1 224,-3-3 1045,4-5-991,-6 2 1195,1-11-526,-10 11 833,-3-7-158,-2 9 609,0-1-293,0 1-183,-19 2-2093,14 1 928,-31 3-2183,14 0-243,-21 5-889,8 1-327,1 23 973,4 10 512,9 12 2400,3 3-993,6 11 2289,11-12-1126,7-5 0,2 0 1447,-3 8-1606,23-9 0,5-2-886,-5 4-436,3-15 1,2-2-1912,11 5-173,4-5 1923,3-5 0,3-5 0,1-2 0</inkml:trace>
+  <inkml:trace contextRef="#ctx0" brushRef="#br0" timeOffset="2056">4278 2036 5686,'-41'-1'866,"7"1"-729,5 17 2014,7-13-2007,0 32 2111,-8-7-1175,11 10 376,-3 18 889,15-22 320,3 11 211,25-6-1874,-16-12-603,24-6 0,6-4-1805,-6-2 671,12-7 1,3-2-1326,3-3-234,12-3-366,-6-19 367,-18-5 1292,14-22 665,-29 7 1788,-3 0 463,-12 8 839,-5 1 536,0-1 190,0 2-757,0 3-707,-20-7-1193,-1 16-1664,-14 21-1126,16 12 644,7 27 898,3-7-125,7 8 543,-11 3-517,11 8 991,-3-13 0,0 2 386,4-11 0,-1 2 24,-4 27 1,0 0-567,3-23 1,-1-3-688,-1 14 1,0-2-137,0-14 1,1-2 472,-3 31 1,-1-5-1,0-3 1</inkml:trace>
+  <inkml:trace contextRef="#ctx0" brushRef="#br0" timeOffset="2786">4933 2286 5326,'0'-6'9830,"3"0"-5238,0 2-3256,3 1-2308,-2 2-682,1 0 299,0 1 96,-1 18 4041,2-14-4585,3 54 2377,-1-28-246,-1 13 0,-1 3 1551,1 5-653,-2-17 1,0 0 1306,4 11 175,1-6-2734,3-4 1120,2-9-1704,2-4-291,3-11-1021,11-5-576,-5-6-367,19-17 945,-19-14 974,6-10 344,-13-9 912,-3 9 244,-4-3 1008,-1-1 650,-5 1 623,-2 0-453,-4-12-1145,0 17 74,0-14-626,0 31 237,0 0-394,0 31-51,0 16-240,0 27-65,14-3-409,-6-15 1,1 0-245,8 7-284,10 11-105,-14-20 50,13-6-596,-5-3-61,14-5-690,-6-9 224,23-2-412,-22-25 1089,18-13 262,-23-10 676,4-5 732,-16 8 408,-2-1 833,-3-2 530,-5-12 712,-1 16-973,-2-16-39,0 30-547,-14-2-1272,10 37 22,-11 24-325,15 6 320,8-6 1,2 0-447,-6 2-185,14 13-817,-2-17-768,-12-3 1408,28-1 518,-11 6 0,7-12 0,-1 4 0</inkml:trace>
+  <inkml:trace contextRef="#ctx0" brushRef="#br0" timeOffset="2968">5790 1920 4246,'0'0'0</inkml:trace>
+  <inkml:trace contextRef="#ctx0" brushRef="#br0" timeOffset="3252">6197 1918 5326,'0'33'9830,"0"-4"-1478,0 1-6214,0 13-909,21-8-1842,-15 15 704,11-19 0,3-1-475,1 18 1517,-3-5 1,1-1-1954,11 9 372,-14-8 1,-2-1-183,2 6 300,-6-11 1,-2-2 656,1-2-919,-2 6-2137,-2-24 2600,-3-24 0,0 9 1,-2-18-1</inkml:trace>
+  <inkml:trace contextRef="#ctx0" brushRef="#br0" timeOffset="3598">6438 2074 4606,'23'21'6080,"16"5"-5014,-18 22 1608,14-12-2111,-4-2-23,-3-10-456,3-3-302,2-9 841,7 7-1428,1-16-385,4 7-972,20-10 594,-17 0 816,-10-5 0,-1-5 13,0-12 944,7 2 178,-24-21 1407,-5 22 345,-7-20 525,-4 11 683,-3 0-174,-1 1 127,-21-7-2277,-4 11-135,-24-2-1960,11 18-9,-2 2-1362,12 5-266,-1 0-397,3 24 1649,-8 9 998,19 15 990,5-13 1,3 0 1214,7 14-613,21-6 1,8 0 588,9 11-1025,2-20 0,6-1-1233,6 1 0,0-3-652,-11-8 0,2-1 1083,16 8 0,1-3 0,-18-10 1,0-2-1,1-1 0,1 1 0</inkml:trace>
+  <inkml:trace contextRef="#ctx0" brushRef="#br0" timeOffset="3754">8195 2535 8384,'1'-17'4915,"0"3"0</inkml:trace>
+  <inkml:trace contextRef="#ctx0" brushRef="#br1" timeOffset="7924">6393 2508 7713,'0'-16'629,"0"0"-539,0 4 0,0 1 180,15-5-90,-11 5 0,11-5-180,-3 6 180,-10-1 269,19-10-269,-10 5 90,7-13-180,-4 10 180,4-11-180,-8 10-180,11-16 90,-7 15 0,5-8 0,8-2 0,-4 8-630,23-21-89,-14 20-316,-5 3 1,1 0 1034,4 0 0,7-4 0,-15 12 0</inkml:trace>
+  <inkml:trace contextRef="#ctx0" brushRef="#br1" timeOffset="9304">9660 1382 8972,'0'20'2339,"0"-3"-2339,0-7-90,0-4 180,0-1-180,0 0 0,0 1-360,-10 0-180,7 2-629,-7-1-90,10 2-327,-8 1 1676,6 2 0,-5 1 0,7 1 0</inkml:trace>
+  <inkml:trace contextRef="#ctx0" brushRef="#br1" timeOffset="9533">9910 1266 9602,'-25'30'809,"-10"-11"-809,31 4 0,-21-12-90,23 12-360,-9-1-359,4-1-1710,5 27 2519,-5-18 0,7 17 0,0-24 0</inkml:trace>
+  <inkml:trace contextRef="#ctx0" brushRef="#br1" timeOffset="9683">9918 1428 7443,'-21'42'-338,"9"-8"1,-3 3 0,8-9 0</inkml:trace>
+  <inkml:trace contextRef="#ctx0" brushRef="#br1" timeOffset="10567">10563 2741 8882,'17'-29'674,"-7"-8"1,1 0-315,10 1-270,5-14 0,0-4-772,-4-4 997,7 7 0,2 1-225,-5-7 180,-6 10 0,-3 0 89,-6-2-179,10-10 0,-19 25-270,9 5 279,-10 7 621,2 2-578,-3 28-232,0 17 0,0 19-1274,0 14 1274,0-4 0,7-8 0,3 3-45,-1-12 0,1 2-165,2 7 0,1 5 0,-1-5-15,-3-2 1,1-1-46,8 15 0,-2-1-45,-14-16 0,0-3-90,14 1 1,-1-1-46,-13-1 0,0-1 90,9-1 1,1-2-181,-10 29 473,7-8-922,-9 8 269,0-23 720,0 3 0,0-27 0,0-4 0</inkml:trace>
+  <inkml:trace contextRef="#ctx0" brushRef="#br1" timeOffset="10683">10890 3097 8162,'-13'-45'900,"9"1"-720,-16-2 90,19-17-360,-6 17-1567,7-11 1567,20 22-90,-15 3-359,37 3-181,-20 2-89,21 4-271,-4 2 1080,3 1 0,3 3 0,2-1 0</inkml:trace>
+  <inkml:trace contextRef="#ctx0" brushRef="#br1" timeOffset="10874">11607 2128 9691,'0'-9'720,"-17"1"-450,12 3 539,-12 0-988,17 24-361,0 6-899,0 27 539,0-9-1349,0 15 2249,0-23 0,16 8 0,3-14 0</inkml:trace>
+  <inkml:trace contextRef="#ctx0" brushRef="#br1" timeOffset="11049">11512 1714 8612,'-12'-17'-1619,"6"6"1619,0 20 0,30-6 0,6 15 0</inkml:trace>
+  <inkml:trace contextRef="#ctx0" brushRef="#br1" timeOffset="11386">12018 2510 9512,'0'-46'449,"0"8"-359,0-8 180,18-12 0,1 10-1666,-2 5 0,1-1 1575,0-12-89,-4 19 0,-2 0 90,-10-16-491,10 0 581,-4 0 215,-7 15 1,0 1-216,6-18-135,-5 14 0,-4 1-225,-14 1 106,13-10 164,-13 31 1170,3 3-1350,10 31 1168,-9 3-1528,12 43 90,0-14-447,0 2 0,0 2-2,0 14-91,8-6 0,1-1 405,-7-24 1,1-1 44,13 10 0,3 1 360,-7-4 0,1-3 0,22 19 0,-17-22 0,0 1 0</inkml:trace>
+  <inkml:trace contextRef="#ctx0" brushRef="#br1" timeOffset="11700">12405 2316 9961,'-19'-8'990,"5"0"-900,14-5-180,0 2 90,17 3 90,-12 1-180,36 1 90,-22-1-90,23 0 0,-10 0 90,0-2 0,1 1-180,-3-2 90,6-6 90,-15 2 270,-2-12-180,-15 8 180,-4-4-1,0 4 1,-26 3-180,19-1 270,-43 1-270,20 4 0,-18 2-180,7 7 90,19 21 0,10 6-270,12 12-180,0 1-179,18-8-1260,13 17 540,10-12 1349,-7-6 0,1-2 0,11 2 0,-14-11 0,1 0 0</inkml:trace>
+  <inkml:trace contextRef="#ctx0" brushRef="#br1" timeOffset="12006">12975 1260 9512,'19'-12'1169,"1"5"-629,18-2-450,-2 7 89,-10 0-89,0 2-90,-9 20 90,0-15-90,0 40 0,-1-23-90,-6 11 0,-1 3-269,6 13-271,-7-3 0,-3 2-949,0 9 1039,-3-18 1,-1-2-720,-1 12 1259,0-6 0,0-4 0,0-5 0</inkml:trace>
+  <inkml:trace contextRef="#ctx0" brushRef="#br1" timeOffset="12216">13302 1331 10141,'7'-2'1259,"0"0"-1169,-4 2-180,3 15-719,0 8 89,1 11-1708,1 23 2428,-5-14 0,0 19 0,-3-13 0</inkml:trace>
+  <inkml:trace contextRef="#ctx0" brushRef="#br1" timeOffset="12736">13987 2141 10321,'6'0'-2968,"0"0"2968,1 0 0,1 0 0,3 0 0</inkml:trace>
+  <inkml:trace contextRef="#ctx0" brushRef="#br1" timeOffset="12918">14202 2458 10771,'7'32'1169,"1"-1"-539,9 8-270,-3-11-180,11 14-91,-11-20-89,8 15 90,-11-16-359,1 5-1530,-9 0-270,-1-3 2069,-42 26 0,5-12 0,0-11 0,0-1 0</inkml:trace>
 </inkml:ink>
 </file>
 
@@ -6431,6 +6485,57 @@
           <a:chExt cx="0" cy="0"/>
         </a:xfrm>
       </p:grpSpPr>
+      <mc:AlternateContent xmlns:mc="http://schemas.openxmlformats.org/markup-compatibility/2006">
+        <mc:Choice xmlns:p14="http://schemas.microsoft.com/office/powerpoint/2010/main" Requires="p14">
+          <p:contentPart p14:bwMode="auto" r:id="rId2">
+            <p14:nvContentPartPr>
+              <p14:cNvPr id="3" name="Ink 2">
+                <a:extLst>
+                  <a:ext uri="{FF2B5EF4-FFF2-40B4-BE49-F238E27FC236}">
+                    <a16:creationId xmlns:a16="http://schemas.microsoft.com/office/drawing/2014/main" id="{4299E59A-72E6-884F-8369-6CA610AD3B9A}"/>
+                  </a:ext>
+                </a:extLst>
+              </p14:cNvPr>
+              <p14:cNvContentPartPr/>
+              <p14:nvPr/>
+            </p14:nvContentPartPr>
+            <p14:xfrm>
+              <a:off x="958320" y="442080"/>
+              <a:ext cx="4203360" cy="732600"/>
+            </p14:xfrm>
+          </p:contentPart>
+        </mc:Choice>
+        <mc:Fallback>
+          <p:pic>
+            <p:nvPicPr>
+              <p:cNvPr id="3" name="Ink 2">
+                <a:extLst>
+                  <a:ext uri="{FF2B5EF4-FFF2-40B4-BE49-F238E27FC236}">
+                    <a16:creationId xmlns:a16="http://schemas.microsoft.com/office/drawing/2014/main" id="{4299E59A-72E6-884F-8369-6CA610AD3B9A}"/>
+                  </a:ext>
+                </a:extLst>
+              </p:cNvPr>
+              <p:cNvPicPr/>
+              <p:nvPr/>
+            </p:nvPicPr>
+            <p:blipFill>
+              <a:blip r:embed="rId3"/>
+              <a:stretch>
+                <a:fillRect/>
+              </a:stretch>
+            </p:blipFill>
+            <p:spPr>
+              <a:xfrm>
+                <a:off x="936720" y="425880"/>
+                <a:ext cx="4241160" cy="765000"/>
+              </a:xfrm>
+              <a:prstGeom prst="rect">
+                <a:avLst/>
+              </a:prstGeom>
+            </p:spPr>
+          </p:pic>
+        </mc:Fallback>
+      </mc:AlternateContent>
     </p:spTree>
     <p:extLst>
       <p:ext uri="{BB962C8B-B14F-4D97-AF65-F5344CB8AC3E}">

</xml_diff>